<commit_message>
Corrección CSS de Crear-Clases
</commit_message>
<xml_diff>
--- a/BOOKING CLASSROOM.pptx
+++ b/BOOKING CLASSROOM.pptx
@@ -9,13 +9,12 @@
     <p:sldId id="257" r:id="rId3"/>
     <p:sldId id="258" r:id="rId4"/>
     <p:sldId id="259" r:id="rId5"/>
-    <p:sldId id="263" r:id="rId6"/>
-    <p:sldId id="261" r:id="rId7"/>
+    <p:sldId id="261" r:id="rId6"/>
+    <p:sldId id="268" r:id="rId7"/>
     <p:sldId id="262" r:id="rId8"/>
-    <p:sldId id="264" r:id="rId9"/>
-    <p:sldId id="265" r:id="rId10"/>
-    <p:sldId id="266" r:id="rId11"/>
-    <p:sldId id="267" r:id="rId12"/>
+    <p:sldId id="265" r:id="rId9"/>
+    <p:sldId id="266" r:id="rId10"/>
+    <p:sldId id="267" r:id="rId11"/>
   </p:sldIdLst>
   <p:sldSz cx="12192000" cy="6858000"/>
   <p:notesSz cx="6858000" cy="9144000"/>
@@ -114,6 +113,11 @@
       </a:defRPr>
     </a:lvl9pPr>
   </p:defaultTextStyle>
+  <p:extLst>
+    <p:ext uri="{EFAFB233-063F-42B5-8137-9DF3F51BA10A}">
+      <p15:sldGuideLst xmlns:p15="http://schemas.microsoft.com/office/powerpoint/2012/main"/>
+    </p:ext>
+  </p:extLst>
 </p:presentation>
 </file>
 
@@ -268,7 +272,7 @@
           <a:p>
             <a:fld id="{B6D41BCC-AD73-4203-A5A6-E62EB28B0FE6}" type="datetimeFigureOut">
               <a:rPr lang="en-US" smtClean="0"/>
-              <a:t>6/25/2023</a:t>
+              <a:t>6/28/2023</a:t>
             </a:fld>
             <a:endParaRPr lang="en-US"/>
           </a:p>
@@ -476,7 +480,7 @@
           <a:p>
             <a:fld id="{B6D41BCC-AD73-4203-A5A6-E62EB28B0FE6}" type="datetimeFigureOut">
               <a:rPr lang="en-US" smtClean="0"/>
-              <a:t>6/25/2023</a:t>
+              <a:t>6/28/2023</a:t>
             </a:fld>
             <a:endParaRPr lang="en-US"/>
           </a:p>
@@ -684,7 +688,7 @@
           <a:p>
             <a:fld id="{B6D41BCC-AD73-4203-A5A6-E62EB28B0FE6}" type="datetimeFigureOut">
               <a:rPr lang="en-US" smtClean="0"/>
-              <a:t>6/25/2023</a:t>
+              <a:t>6/28/2023</a:t>
             </a:fld>
             <a:endParaRPr lang="en-US"/>
           </a:p>
@@ -882,7 +886,7 @@
           <a:p>
             <a:fld id="{B6D41BCC-AD73-4203-A5A6-E62EB28B0FE6}" type="datetimeFigureOut">
               <a:rPr lang="en-US" smtClean="0"/>
-              <a:t>6/25/2023</a:t>
+              <a:t>6/28/2023</a:t>
             </a:fld>
             <a:endParaRPr lang="en-US"/>
           </a:p>
@@ -1159,7 +1163,7 @@
           <a:p>
             <a:fld id="{B6D41BCC-AD73-4203-A5A6-E62EB28B0FE6}" type="datetimeFigureOut">
               <a:rPr lang="en-US" smtClean="0"/>
-              <a:t>6/25/2023</a:t>
+              <a:t>6/28/2023</a:t>
             </a:fld>
             <a:endParaRPr lang="en-US"/>
           </a:p>
@@ -1429,7 +1433,7 @@
           <a:p>
             <a:fld id="{B6D41BCC-AD73-4203-A5A6-E62EB28B0FE6}" type="datetimeFigureOut">
               <a:rPr lang="en-US" smtClean="0"/>
-              <a:t>6/25/2023</a:t>
+              <a:t>6/28/2023</a:t>
             </a:fld>
             <a:endParaRPr lang="en-US"/>
           </a:p>
@@ -1845,7 +1849,7 @@
           <a:p>
             <a:fld id="{B6D41BCC-AD73-4203-A5A6-E62EB28B0FE6}" type="datetimeFigureOut">
               <a:rPr lang="en-US" smtClean="0"/>
-              <a:t>6/25/2023</a:t>
+              <a:t>6/28/2023</a:t>
             </a:fld>
             <a:endParaRPr lang="en-US"/>
           </a:p>
@@ -1986,7 +1990,7 @@
           <a:p>
             <a:fld id="{B6D41BCC-AD73-4203-A5A6-E62EB28B0FE6}" type="datetimeFigureOut">
               <a:rPr lang="en-US" smtClean="0"/>
-              <a:t>6/25/2023</a:t>
+              <a:t>6/28/2023</a:t>
             </a:fld>
             <a:endParaRPr lang="en-US"/>
           </a:p>
@@ -2099,7 +2103,7 @@
           <a:p>
             <a:fld id="{B6D41BCC-AD73-4203-A5A6-E62EB28B0FE6}" type="datetimeFigureOut">
               <a:rPr lang="en-US" smtClean="0"/>
-              <a:t>6/25/2023</a:t>
+              <a:t>6/28/2023</a:t>
             </a:fld>
             <a:endParaRPr lang="en-US"/>
           </a:p>
@@ -2425,7 +2429,7 @@
           <a:p>
             <a:fld id="{B6D41BCC-AD73-4203-A5A6-E62EB28B0FE6}" type="datetimeFigureOut">
               <a:rPr lang="en-US" smtClean="0"/>
-              <a:t>6/25/2023</a:t>
+              <a:t>6/28/2023</a:t>
             </a:fld>
             <a:endParaRPr lang="en-US"/>
           </a:p>
@@ -2713,7 +2717,7 @@
           <a:p>
             <a:fld id="{B6D41BCC-AD73-4203-A5A6-E62EB28B0FE6}" type="datetimeFigureOut">
               <a:rPr lang="en-US" smtClean="0"/>
-              <a:t>6/25/2023</a:t>
+              <a:t>6/28/2023</a:t>
             </a:fld>
             <a:endParaRPr lang="en-US"/>
           </a:p>
@@ -2953,7 +2957,7 @@
             <a:fld id="{B6D41BCC-AD73-4203-A5A6-E62EB28B0FE6}" type="datetimeFigureOut">
               <a:rPr lang="en-US" smtClean="0"/>
               <a:pPr/>
-              <a:t>6/25/2023</a:t>
+              <a:t>6/28/2023</a:t>
             </a:fld>
             <a:endParaRPr lang="en-US"/>
           </a:p>
@@ -3567,170 +3571,6 @@
           <p:cNvPr id="2" name="Título 1">
             <a:extLst>
               <a:ext uri="{FF2B5EF4-FFF2-40B4-BE49-F238E27FC236}">
-                <a16:creationId xmlns:a16="http://schemas.microsoft.com/office/drawing/2014/main" id="{7DB7CBDD-40C8-1EC9-C46C-24587E8CE4ED}"/>
-              </a:ext>
-            </a:extLst>
-          </p:cNvPr>
-          <p:cNvSpPr>
-            <a:spLocks noGrp="1"/>
-          </p:cNvSpPr>
-          <p:nvPr>
-            <p:ph type="title"/>
-          </p:nvPr>
-        </p:nvSpPr>
-        <p:spPr/>
-        <p:txBody>
-          <a:bodyPr/>
-          <a:lstStyle/>
-          <a:p>
-            <a:r>
-              <a:rPr lang="es-ES" dirty="0">
-                <a:solidFill>
-                  <a:schemeClr val="accent4">
-                    <a:lumMod val="50000"/>
-                  </a:schemeClr>
-                </a:solidFill>
-              </a:rPr>
-              <a:t>MEJORAS A FUTURO</a:t>
-            </a:r>
-          </a:p>
-        </p:txBody>
-      </p:sp>
-      <p:sp>
-        <p:nvSpPr>
-          <p:cNvPr id="3" name="Marcador de contenido 2">
-            <a:extLst>
-              <a:ext uri="{FF2B5EF4-FFF2-40B4-BE49-F238E27FC236}">
-                <a16:creationId xmlns:a16="http://schemas.microsoft.com/office/drawing/2014/main" id="{C3B50C2C-649B-F378-ACC2-4FA8FE2DF966}"/>
-              </a:ext>
-            </a:extLst>
-          </p:cNvPr>
-          <p:cNvSpPr>
-            <a:spLocks noGrp="1"/>
-          </p:cNvSpPr>
-          <p:nvPr>
-            <p:ph idx="1"/>
-          </p:nvPr>
-        </p:nvSpPr>
-        <p:spPr/>
-        <p:txBody>
-          <a:bodyPr/>
-          <a:lstStyle/>
-          <a:p>
-            <a:r>
-              <a:rPr lang="es-ES" dirty="0">
-                <a:solidFill>
-                  <a:schemeClr val="accent4">
-                    <a:lumMod val="50000"/>
-                  </a:schemeClr>
-                </a:solidFill>
-              </a:rPr>
-              <a:t>NOTIFICACIÓN POR EMAIL</a:t>
-            </a:r>
-          </a:p>
-          <a:p>
-            <a:r>
-              <a:rPr lang="es-ES" dirty="0">
-                <a:solidFill>
-                  <a:schemeClr val="accent4">
-                    <a:lumMod val="50000"/>
-                  </a:schemeClr>
-                </a:solidFill>
-              </a:rPr>
-              <a:t>LISTA DE ESPERA</a:t>
-            </a:r>
-          </a:p>
-          <a:p>
-            <a:r>
-              <a:rPr lang="es-ES" dirty="0">
-                <a:solidFill>
-                  <a:schemeClr val="accent4">
-                    <a:lumMod val="50000"/>
-                  </a:schemeClr>
-                </a:solidFill>
-              </a:rPr>
-              <a:t>RESERVAS RECURRENTES</a:t>
-            </a:r>
-          </a:p>
-          <a:p>
-            <a:r>
-              <a:rPr lang="es-ES" dirty="0">
-                <a:solidFill>
-                  <a:schemeClr val="accent4">
-                    <a:lumMod val="50000"/>
-                  </a:schemeClr>
-                </a:solidFill>
-              </a:rPr>
-              <a:t>CALENDARIO VISUAL</a:t>
-            </a:r>
-          </a:p>
-        </p:txBody>
-      </p:sp>
-      <p:pic>
-        <p:nvPicPr>
-          <p:cNvPr id="5" name="Imagen 4">
-            <a:extLst>
-              <a:ext uri="{FF2B5EF4-FFF2-40B4-BE49-F238E27FC236}">
-                <a16:creationId xmlns:a16="http://schemas.microsoft.com/office/drawing/2014/main" id="{9939B0B5-506B-43DF-4BF9-218B6FE011A3}"/>
-              </a:ext>
-            </a:extLst>
-          </p:cNvPr>
-          <p:cNvPicPr>
-            <a:picLocks noChangeAspect="1"/>
-          </p:cNvPicPr>
-          <p:nvPr/>
-        </p:nvPicPr>
-        <p:blipFill>
-          <a:blip r:embed="rId2"/>
-          <a:stretch>
-            <a:fillRect/>
-          </a:stretch>
-        </p:blipFill>
-        <p:spPr>
-          <a:xfrm>
-            <a:off x="6569399" y="1371600"/>
-            <a:ext cx="4458322" cy="4925112"/>
-          </a:xfrm>
-          <a:prstGeom prst="rect">
-            <a:avLst/>
-          </a:prstGeom>
-        </p:spPr>
-      </p:pic>
-    </p:spTree>
-    <p:extLst>
-      <p:ext uri="{BB962C8B-B14F-4D97-AF65-F5344CB8AC3E}">
-        <p14:creationId xmlns:p14="http://schemas.microsoft.com/office/powerpoint/2010/main" val="2780896091"/>
-      </p:ext>
-    </p:extLst>
-  </p:cSld>
-  <p:clrMapOvr>
-    <a:masterClrMapping/>
-  </p:clrMapOvr>
-</p:sld>
-</file>
-
-<file path=ppt/slides/slide11.xml><?xml version="1.0" encoding="utf-8"?>
-<p:sld xmlns:a="http://schemas.openxmlformats.org/drawingml/2006/main" xmlns:r="http://schemas.openxmlformats.org/officeDocument/2006/relationships" xmlns:p="http://schemas.openxmlformats.org/presentationml/2006/main">
-  <p:cSld>
-    <p:spTree>
-      <p:nvGrpSpPr>
-        <p:cNvPr id="1" name=""/>
-        <p:cNvGrpSpPr/>
-        <p:nvPr/>
-      </p:nvGrpSpPr>
-      <p:grpSpPr>
-        <a:xfrm>
-          <a:off x="0" y="0"/>
-          <a:ext cx="0" cy="0"/>
-          <a:chOff x="0" y="0"/>
-          <a:chExt cx="0" cy="0"/>
-        </a:xfrm>
-      </p:grpSpPr>
-      <p:sp>
-        <p:nvSpPr>
-          <p:cNvPr id="2" name="Título 1">
-            <a:extLst>
-              <a:ext uri="{FF2B5EF4-FFF2-40B4-BE49-F238E27FC236}">
                 <a16:creationId xmlns:a16="http://schemas.microsoft.com/office/drawing/2014/main" id="{2431E301-30B0-574F-D55C-DF6459E0DE8E}"/>
               </a:ext>
             </a:extLst>
@@ -3897,7 +3737,7 @@
                   </a:schemeClr>
                 </a:solidFill>
               </a:rPr>
-              <a:t>USUARIOS</a:t>
+              <a:t>TECNOLOGÍA A UTILIZAR</a:t>
             </a:r>
           </a:p>
           <a:p>
@@ -3909,7 +3749,7 @@
                   </a:schemeClr>
                 </a:solidFill>
               </a:rPr>
-              <a:t>TECNOLOGÍA A UTILIZAR</a:t>
+              <a:t>MODELO DE DATOS</a:t>
             </a:r>
           </a:p>
           <a:p>
@@ -3933,37 +3773,8 @@
                   </a:schemeClr>
                 </a:solidFill>
               </a:rPr>
-              <a:t>ESTRUCTURA DE </a:t>
-            </a:r>
-            <a:r>
-              <a:rPr lang="es-ES">
-                <a:solidFill>
-                  <a:schemeClr val="accent4">
-                    <a:lumMod val="50000"/>
-                  </a:schemeClr>
-                </a:solidFill>
-              </a:rPr>
-              <a:t>LA APLICACIÓN</a:t>
-            </a:r>
-          </a:p>
-          <a:p>
-            <a:r>
-              <a:rPr lang="es-ES">
-                <a:solidFill>
-                  <a:schemeClr val="accent4">
-                    <a:lumMod val="50000"/>
-                  </a:schemeClr>
-                </a:solidFill>
-              </a:rPr>
               <a:t>DEMOSTRACIÓN</a:t>
             </a:r>
-            <a:endParaRPr lang="es-ES" dirty="0">
-              <a:solidFill>
-                <a:schemeClr val="accent4">
-                  <a:lumMod val="50000"/>
-                </a:schemeClr>
-              </a:solidFill>
-            </a:endParaRPr>
           </a:p>
           <a:p>
             <a:r>
@@ -4385,110 +4196,6 @@
       </p:sp>
       <p:sp>
         <p:nvSpPr>
-          <p:cNvPr id="10" name="Date Placeholder 3">
-            <a:extLst>
-              <a:ext uri="{FF2B5EF4-FFF2-40B4-BE49-F238E27FC236}">
-                <a16:creationId xmlns:a16="http://schemas.microsoft.com/office/drawing/2014/main" id="{EA212C5A-8FAE-471C-AF2F-1E8E9BE94D0C}"/>
-              </a:ext>
-            </a:extLst>
-          </p:cNvPr>
-          <p:cNvSpPr>
-            <a:spLocks noGrp="1"/>
-          </p:cNvSpPr>
-          <p:nvPr>
-            <p:ph type="dt" sz="half" idx="10"/>
-          </p:nvPr>
-        </p:nvSpPr>
-        <p:spPr>
-          <a:xfrm rot="5400000">
-            <a:off x="-1001475" y="1517536"/>
-            <a:ext cx="2801123" cy="365125"/>
-          </a:xfrm>
-        </p:spPr>
-        <p:txBody>
-          <a:bodyPr/>
-          <a:lstStyle/>
-          <a:p>
-            <a:pPr>
-              <a:spcAft>
-                <a:spcPts val="600"/>
-              </a:spcAft>
-            </a:pPr>
-            <a:fld id="{A42CE256-A16D-4C05-82F9-D2517162EDD4}" type="datetime1">
-              <a:rPr lang="en-US" smtClean="0">
-                <a:solidFill>
-                  <a:srgbClr val="FFFFFF"/>
-                </a:solidFill>
-                <a:effectLst>
-                  <a:outerShdw blurRad="38100" dist="38100" dir="2700000" algn="tl">
-                    <a:srgbClr val="000000">
-                      <a:alpha val="43137"/>
-                    </a:srgbClr>
-                  </a:outerShdw>
-                </a:effectLst>
-              </a:rPr>
-              <a:pPr>
-                <a:spcAft>
-                  <a:spcPts val="600"/>
-                </a:spcAft>
-              </a:pPr>
-              <a:t>6/25/2023</a:t>
-            </a:fld>
-            <a:endParaRPr lang="en-US" dirty="0">
-              <a:solidFill>
-                <a:srgbClr val="FFFFFF"/>
-              </a:solidFill>
-              <a:effectLst>
-                <a:outerShdw blurRad="38100" dist="38100" dir="2700000" algn="tl">
-                  <a:srgbClr val="000000">
-                    <a:alpha val="43137"/>
-                  </a:srgbClr>
-                </a:outerShdw>
-              </a:effectLst>
-            </a:endParaRPr>
-          </a:p>
-        </p:txBody>
-      </p:sp>
-      <p:sp>
-        <p:nvSpPr>
-          <p:cNvPr id="12" name="Footer Placeholder 4">
-            <a:extLst>
-              <a:ext uri="{FF2B5EF4-FFF2-40B4-BE49-F238E27FC236}">
-                <a16:creationId xmlns:a16="http://schemas.microsoft.com/office/drawing/2014/main" id="{C1C9EDAE-C2E5-46B5-A644-497C25568184}"/>
-              </a:ext>
-            </a:extLst>
-          </p:cNvPr>
-          <p:cNvSpPr>
-            <a:spLocks noGrp="1"/>
-          </p:cNvSpPr>
-          <p:nvPr>
-            <p:ph type="ftr" sz="quarter" idx="11"/>
-          </p:nvPr>
-        </p:nvSpPr>
-        <p:spPr>
-          <a:xfrm rot="5400000">
-            <a:off x="10118764" y="4237870"/>
-            <a:ext cx="3344053" cy="365125"/>
-          </a:xfrm>
-        </p:spPr>
-        <p:txBody>
-          <a:bodyPr/>
-          <a:lstStyle/>
-          <a:p>
-            <a:pPr>
-              <a:spcAft>
-                <a:spcPts val="600"/>
-              </a:spcAft>
-            </a:pPr>
-            <a:r>
-              <a:rPr lang="en-US"/>
-              <a:t>Sample Footer Text</a:t>
-            </a:r>
-          </a:p>
-        </p:txBody>
-      </p:sp>
-      <p:sp>
-        <p:nvSpPr>
           <p:cNvPr id="14" name="Slide Number Placeholder 5">
             <a:extLst>
               <a:ext uri="{FF2B5EF4-FFF2-40B4-BE49-F238E27FC236}">
@@ -4566,7 +4273,7 @@
           <p:cNvPr id="2" name="Título 1">
             <a:extLst>
               <a:ext uri="{FF2B5EF4-FFF2-40B4-BE49-F238E27FC236}">
-                <a16:creationId xmlns:a16="http://schemas.microsoft.com/office/drawing/2014/main" id="{0AA0BE48-FE50-70B1-351E-7D791CF2650A}"/>
+                <a16:creationId xmlns:a16="http://schemas.microsoft.com/office/drawing/2014/main" id="{0E436F96-FF4B-D0E5-DA2F-D1B04BAA5B51}"/>
               </a:ext>
             </a:extLst>
           </p:cNvPr>
@@ -4577,7 +4284,12 @@
             <p:ph type="title"/>
           </p:nvPr>
         </p:nvSpPr>
-        <p:spPr/>
+        <p:spPr>
+          <a:xfrm>
+            <a:off x="1056521" y="206102"/>
+            <a:ext cx="8915402" cy="1028900"/>
+          </a:xfrm>
+        </p:spPr>
         <p:txBody>
           <a:bodyPr/>
           <a:lstStyle/>
@@ -4590,7 +4302,7 @@
                   </a:schemeClr>
                 </a:solidFill>
               </a:rPr>
-              <a:t>USUARIOS</a:t>
+              <a:t>TECNOLOGÍAS UTILIZADAS</a:t>
             </a:r>
           </a:p>
         </p:txBody>
@@ -4600,7 +4312,7 @@
           <p:cNvPr id="3" name="Marcador de contenido 2">
             <a:extLst>
               <a:ext uri="{FF2B5EF4-FFF2-40B4-BE49-F238E27FC236}">
-                <a16:creationId xmlns:a16="http://schemas.microsoft.com/office/drawing/2014/main" id="{E4A0B6D9-9FA4-330D-BCE8-386CECFD1CC4}"/>
+                <a16:creationId xmlns:a16="http://schemas.microsoft.com/office/drawing/2014/main" id="{16639217-463C-264A-5151-9B08157441F4}"/>
               </a:ext>
             </a:extLst>
           </p:cNvPr>
@@ -4613,47 +4325,73 @@
         </p:nvSpPr>
         <p:spPr>
           <a:xfrm>
-            <a:off x="2048509" y="2057400"/>
-            <a:ext cx="7932422" cy="1894840"/>
-          </a:xfrm>
-        </p:spPr>
-        <p:txBody>
-          <a:bodyPr>
-            <a:normAutofit/>
-          </a:bodyPr>
-          <a:lstStyle/>
-          <a:p>
-            <a:pPr marL="0" indent="0" algn="ctr">
-              <a:buNone/>
-            </a:pPr>
-            <a:endParaRPr lang="es-ES" sz="2400" dirty="0"/>
-          </a:p>
-          <a:p>
-            <a:pPr marL="0" indent="0" algn="ctr">
-              <a:buNone/>
-            </a:pPr>
-            <a:r>
-              <a:rPr lang="es-ES" sz="2400" dirty="0">
+            <a:off x="1638297" y="1427878"/>
+            <a:ext cx="8915402" cy="4137259"/>
+          </a:xfrm>
+        </p:spPr>
+        <p:txBody>
+          <a:bodyPr/>
+          <a:lstStyle/>
+          <a:p>
+            <a:r>
+              <a:rPr lang="es-ES" dirty="0">
                 <a:solidFill>
                   <a:schemeClr val="accent4">
                     <a:lumMod val="50000"/>
                   </a:schemeClr>
                 </a:solidFill>
               </a:rPr>
-              <a:t>PROFESORES	VS	ADMINISTRADORES</a:t>
-            </a:r>
-          </a:p>
-          <a:p>
-            <a:pPr marL="274320" lvl="1" indent="0">
-              <a:buNone/>
-            </a:pPr>
-            <a:endParaRPr lang="es-ES" sz="2000" dirty="0"/>
-          </a:p>
-          <a:p>
-            <a:pPr marL="274320" lvl="1" indent="0">
-              <a:buNone/>
-            </a:pPr>
-            <a:endParaRPr lang="es-ES" sz="2000" dirty="0"/>
+              <a:t>ANGULAR</a:t>
+            </a:r>
+          </a:p>
+          <a:p>
+            <a:pPr lvl="1"/>
+            <a:endParaRPr lang="es-ES" dirty="0">
+              <a:solidFill>
+                <a:schemeClr val="accent4">
+                  <a:lumMod val="50000"/>
+                </a:schemeClr>
+              </a:solidFill>
+            </a:endParaRPr>
+          </a:p>
+          <a:p>
+            <a:endParaRPr lang="es-ES" dirty="0">
+              <a:solidFill>
+                <a:schemeClr val="accent4">
+                  <a:lumMod val="50000"/>
+                </a:schemeClr>
+              </a:solidFill>
+            </a:endParaRPr>
+          </a:p>
+          <a:p>
+            <a:endParaRPr lang="es-ES" dirty="0">
+              <a:solidFill>
+                <a:schemeClr val="accent4">
+                  <a:lumMod val="50000"/>
+                </a:schemeClr>
+              </a:solidFill>
+            </a:endParaRPr>
+          </a:p>
+          <a:p>
+            <a:endParaRPr lang="es-ES" dirty="0">
+              <a:solidFill>
+                <a:schemeClr val="accent4">
+                  <a:lumMod val="50000"/>
+                </a:schemeClr>
+              </a:solidFill>
+            </a:endParaRPr>
+          </a:p>
+          <a:p>
+            <a:r>
+              <a:rPr lang="es-ES" dirty="0">
+                <a:solidFill>
+                  <a:schemeClr val="accent4">
+                    <a:lumMod val="50000"/>
+                  </a:schemeClr>
+                </a:solidFill>
+              </a:rPr>
+              <a:t>FIREBASE</a:t>
+            </a:r>
           </a:p>
         </p:txBody>
       </p:sp>
@@ -4662,7 +4400,7 @@
           <p:cNvPr id="5" name="Imagen 4">
             <a:extLst>
               <a:ext uri="{FF2B5EF4-FFF2-40B4-BE49-F238E27FC236}">
-                <a16:creationId xmlns:a16="http://schemas.microsoft.com/office/drawing/2014/main" id="{84BA4B72-914F-38C2-C1FB-3D512701D447}"/>
+                <a16:creationId xmlns:a16="http://schemas.microsoft.com/office/drawing/2014/main" id="{520C4763-7558-5E84-BFBC-F01F90909AB8}"/>
               </a:ext>
             </a:extLst>
           </p:cNvPr>
@@ -4679,8 +4417,561 @@
         </p:blipFill>
         <p:spPr>
           <a:xfrm>
-            <a:off x="3078247" y="3870960"/>
-            <a:ext cx="6035505" cy="1371601"/>
+            <a:off x="2858355" y="1708948"/>
+            <a:ext cx="1695616" cy="1519272"/>
+          </a:xfrm>
+          <a:prstGeom prst="rect">
+            <a:avLst/>
+          </a:prstGeom>
+        </p:spPr>
+      </p:pic>
+      <p:pic>
+        <p:nvPicPr>
+          <p:cNvPr id="7" name="Imagen 6">
+            <a:extLst>
+              <a:ext uri="{FF2B5EF4-FFF2-40B4-BE49-F238E27FC236}">
+                <a16:creationId xmlns:a16="http://schemas.microsoft.com/office/drawing/2014/main" id="{BE9A92AC-8C02-78DA-7020-B100DD03F715}"/>
+              </a:ext>
+            </a:extLst>
+          </p:cNvPr>
+          <p:cNvPicPr>
+            <a:picLocks noChangeAspect="1"/>
+          </p:cNvPicPr>
+          <p:nvPr/>
+        </p:nvPicPr>
+        <p:blipFill>
+          <a:blip r:embed="rId3"/>
+          <a:stretch>
+            <a:fillRect/>
+          </a:stretch>
+        </p:blipFill>
+        <p:spPr>
+          <a:xfrm>
+            <a:off x="1079078" y="4118694"/>
+            <a:ext cx="3572374" cy="1419423"/>
+          </a:xfrm>
+          <a:prstGeom prst="rect">
+            <a:avLst/>
+          </a:prstGeom>
+        </p:spPr>
+      </p:pic>
+      <p:sp>
+        <p:nvSpPr>
+          <p:cNvPr id="8" name="Abrir llave 7">
+            <a:extLst>
+              <a:ext uri="{FF2B5EF4-FFF2-40B4-BE49-F238E27FC236}">
+                <a16:creationId xmlns:a16="http://schemas.microsoft.com/office/drawing/2014/main" id="{BFF8C844-1369-340E-41E4-09FF5EE0AF98}"/>
+              </a:ext>
+            </a:extLst>
+          </p:cNvPr>
+          <p:cNvSpPr/>
+          <p:nvPr/>
+        </p:nvSpPr>
+        <p:spPr>
+          <a:xfrm>
+            <a:off x="4651452" y="3776969"/>
+            <a:ext cx="1014413" cy="2198822"/>
+          </a:xfrm>
+          <a:prstGeom prst="leftBrace">
+            <a:avLst/>
+          </a:prstGeom>
+          <a:ln>
+            <a:solidFill>
+              <a:schemeClr val="accent4">
+                <a:lumMod val="50000"/>
+              </a:schemeClr>
+            </a:solidFill>
+          </a:ln>
+        </p:spPr>
+        <p:style>
+          <a:lnRef idx="1">
+            <a:schemeClr val="accent1"/>
+          </a:lnRef>
+          <a:fillRef idx="0">
+            <a:schemeClr val="accent1"/>
+          </a:fillRef>
+          <a:effectRef idx="0">
+            <a:schemeClr val="accent1"/>
+          </a:effectRef>
+          <a:fontRef idx="minor">
+            <a:schemeClr val="tx1"/>
+          </a:fontRef>
+        </p:style>
+        <p:txBody>
+          <a:bodyPr rtlCol="0" anchor="ctr"/>
+          <a:lstStyle/>
+          <a:p>
+            <a:pPr algn="ctr"/>
+            <a:endParaRPr lang="es-ES">
+              <a:solidFill>
+                <a:schemeClr val="accent4">
+                  <a:lumMod val="50000"/>
+                </a:schemeClr>
+              </a:solidFill>
+            </a:endParaRPr>
+          </a:p>
+        </p:txBody>
+      </p:sp>
+      <p:sp>
+        <p:nvSpPr>
+          <p:cNvPr id="9" name="CuadroTexto 8">
+            <a:extLst>
+              <a:ext uri="{FF2B5EF4-FFF2-40B4-BE49-F238E27FC236}">
+                <a16:creationId xmlns:a16="http://schemas.microsoft.com/office/drawing/2014/main" id="{6A0D3FD2-6171-6EE6-3E99-E09D915F36ED}"/>
+              </a:ext>
+            </a:extLst>
+          </p:cNvPr>
+          <p:cNvSpPr txBox="1"/>
+          <p:nvPr/>
+        </p:nvSpPr>
+        <p:spPr>
+          <a:xfrm>
+            <a:off x="5382207" y="4089742"/>
+            <a:ext cx="2573330" cy="1477328"/>
+          </a:xfrm>
+          <a:prstGeom prst="rect">
+            <a:avLst/>
+          </a:prstGeom>
+          <a:noFill/>
+        </p:spPr>
+        <p:txBody>
+          <a:bodyPr wrap="square" rtlCol="0">
+            <a:spAutoFit/>
+          </a:bodyPr>
+          <a:lstStyle/>
+          <a:p>
+            <a:pPr marL="285750" indent="-285750">
+              <a:buFont typeface="Arial" panose="020B0604020202020204" pitchFamily="34" charset="0"/>
+              <a:buChar char="•"/>
+            </a:pPr>
+            <a:r>
+              <a:rPr lang="es-ES" dirty="0">
+                <a:solidFill>
+                  <a:schemeClr val="accent4">
+                    <a:lumMod val="50000"/>
+                  </a:schemeClr>
+                </a:solidFill>
+              </a:rPr>
+              <a:t>FIRESTORE BBDD</a:t>
+            </a:r>
+          </a:p>
+          <a:p>
+            <a:pPr marL="285750" indent="-285750">
+              <a:buFont typeface="Arial" panose="020B0604020202020204" pitchFamily="34" charset="0"/>
+              <a:buChar char="•"/>
+            </a:pPr>
+            <a:endParaRPr lang="es-ES" dirty="0">
+              <a:solidFill>
+                <a:schemeClr val="accent4">
+                  <a:lumMod val="50000"/>
+                </a:schemeClr>
+              </a:solidFill>
+            </a:endParaRPr>
+          </a:p>
+          <a:p>
+            <a:pPr marL="285750" indent="-285750">
+              <a:buFont typeface="Arial" panose="020B0604020202020204" pitchFamily="34" charset="0"/>
+              <a:buChar char="•"/>
+            </a:pPr>
+            <a:r>
+              <a:rPr lang="es-ES" dirty="0">
+                <a:solidFill>
+                  <a:schemeClr val="accent4">
+                    <a:lumMod val="50000"/>
+                  </a:schemeClr>
+                </a:solidFill>
+              </a:rPr>
+              <a:t>AUTHENTICATION</a:t>
+            </a:r>
+          </a:p>
+          <a:p>
+            <a:pPr marL="285750" indent="-285750">
+              <a:buFont typeface="Arial" panose="020B0604020202020204" pitchFamily="34" charset="0"/>
+              <a:buChar char="•"/>
+            </a:pPr>
+            <a:endParaRPr lang="es-ES" dirty="0">
+              <a:solidFill>
+                <a:schemeClr val="accent4">
+                  <a:lumMod val="50000"/>
+                </a:schemeClr>
+              </a:solidFill>
+            </a:endParaRPr>
+          </a:p>
+          <a:p>
+            <a:pPr marL="285750" indent="-285750">
+              <a:buFont typeface="Arial" panose="020B0604020202020204" pitchFamily="34" charset="0"/>
+              <a:buChar char="•"/>
+            </a:pPr>
+            <a:r>
+              <a:rPr lang="es-ES" dirty="0">
+                <a:solidFill>
+                  <a:schemeClr val="accent4">
+                    <a:lumMod val="50000"/>
+                  </a:schemeClr>
+                </a:solidFill>
+              </a:rPr>
+              <a:t>HOSTING</a:t>
+            </a:r>
+          </a:p>
+        </p:txBody>
+      </p:sp>
+      <p:sp>
+        <p:nvSpPr>
+          <p:cNvPr id="4" name="Abrir llave 3">
+            <a:extLst>
+              <a:ext uri="{FF2B5EF4-FFF2-40B4-BE49-F238E27FC236}">
+                <a16:creationId xmlns:a16="http://schemas.microsoft.com/office/drawing/2014/main" id="{8BA4171C-5E61-53B4-FD10-6B742E2F86D8}"/>
+              </a:ext>
+            </a:extLst>
+          </p:cNvPr>
+          <p:cNvSpPr/>
+          <p:nvPr/>
+        </p:nvSpPr>
+        <p:spPr>
+          <a:xfrm>
+            <a:off x="4705447" y="1357367"/>
+            <a:ext cx="941900" cy="2198822"/>
+          </a:xfrm>
+          <a:prstGeom prst="leftBrace">
+            <a:avLst/>
+          </a:prstGeom>
+          <a:ln>
+            <a:solidFill>
+              <a:schemeClr val="accent4">
+                <a:lumMod val="50000"/>
+              </a:schemeClr>
+            </a:solidFill>
+          </a:ln>
+        </p:spPr>
+        <p:style>
+          <a:lnRef idx="1">
+            <a:schemeClr val="accent1"/>
+          </a:lnRef>
+          <a:fillRef idx="0">
+            <a:schemeClr val="accent1"/>
+          </a:fillRef>
+          <a:effectRef idx="0">
+            <a:schemeClr val="accent1"/>
+          </a:effectRef>
+          <a:fontRef idx="minor">
+            <a:schemeClr val="tx1"/>
+          </a:fontRef>
+        </p:style>
+        <p:txBody>
+          <a:bodyPr rtlCol="0" anchor="ctr"/>
+          <a:lstStyle/>
+          <a:p>
+            <a:pPr algn="ctr"/>
+            <a:endParaRPr lang="es-ES" dirty="0">
+              <a:solidFill>
+                <a:schemeClr val="accent4">
+                  <a:lumMod val="50000"/>
+                </a:schemeClr>
+              </a:solidFill>
+            </a:endParaRPr>
+          </a:p>
+        </p:txBody>
+      </p:sp>
+      <p:sp>
+        <p:nvSpPr>
+          <p:cNvPr id="6" name="CuadroTexto 5">
+            <a:extLst>
+              <a:ext uri="{FF2B5EF4-FFF2-40B4-BE49-F238E27FC236}">
+                <a16:creationId xmlns:a16="http://schemas.microsoft.com/office/drawing/2014/main" id="{EB48D8B8-EC06-6629-629C-5B9A9C7CD505}"/>
+              </a:ext>
+            </a:extLst>
+          </p:cNvPr>
+          <p:cNvSpPr txBox="1"/>
+          <p:nvPr/>
+        </p:nvSpPr>
+        <p:spPr>
+          <a:xfrm>
+            <a:off x="5328246" y="1895097"/>
+            <a:ext cx="3058524" cy="1477328"/>
+          </a:xfrm>
+          <a:prstGeom prst="rect">
+            <a:avLst/>
+          </a:prstGeom>
+          <a:noFill/>
+        </p:spPr>
+        <p:txBody>
+          <a:bodyPr wrap="square" rtlCol="0">
+            <a:spAutoFit/>
+          </a:bodyPr>
+          <a:lstStyle/>
+          <a:p>
+            <a:pPr marL="285750" indent="-285750">
+              <a:buFont typeface="Arial" panose="020B0604020202020204" pitchFamily="34" charset="0"/>
+              <a:buChar char="•"/>
+            </a:pPr>
+            <a:r>
+              <a:rPr lang="es-ES" dirty="0">
+                <a:solidFill>
+                  <a:schemeClr val="accent4">
+                    <a:lumMod val="50000"/>
+                  </a:schemeClr>
+                </a:solidFill>
+              </a:rPr>
+              <a:t>FRAMEWORK APP-WEB</a:t>
+            </a:r>
+          </a:p>
+          <a:p>
+            <a:pPr marL="285750" indent="-285750">
+              <a:buFont typeface="Arial" panose="020B0604020202020204" pitchFamily="34" charset="0"/>
+              <a:buChar char="•"/>
+            </a:pPr>
+            <a:endParaRPr lang="es-ES" dirty="0">
+              <a:solidFill>
+                <a:schemeClr val="accent4">
+                  <a:lumMod val="50000"/>
+                </a:schemeClr>
+              </a:solidFill>
+            </a:endParaRPr>
+          </a:p>
+          <a:p>
+            <a:pPr marL="285750" indent="-285750">
+              <a:buFont typeface="Arial" panose="020B0604020202020204" pitchFamily="34" charset="0"/>
+              <a:buChar char="•"/>
+            </a:pPr>
+            <a:r>
+              <a:rPr lang="es-ES" dirty="0">
+                <a:solidFill>
+                  <a:schemeClr val="accent4">
+                    <a:lumMod val="50000"/>
+                  </a:schemeClr>
+                </a:solidFill>
+              </a:rPr>
+              <a:t>ANGULAR MATERIAL</a:t>
+            </a:r>
+          </a:p>
+          <a:p>
+            <a:pPr marL="285750" indent="-285750">
+              <a:buFont typeface="Arial" panose="020B0604020202020204" pitchFamily="34" charset="0"/>
+              <a:buChar char="•"/>
+            </a:pPr>
+            <a:endParaRPr lang="es-ES" dirty="0">
+              <a:solidFill>
+                <a:schemeClr val="accent4">
+                  <a:lumMod val="50000"/>
+                </a:schemeClr>
+              </a:solidFill>
+            </a:endParaRPr>
+          </a:p>
+          <a:p>
+            <a:endParaRPr lang="es-ES" dirty="0">
+              <a:solidFill>
+                <a:schemeClr val="accent4">
+                  <a:lumMod val="50000"/>
+                </a:schemeClr>
+              </a:solidFill>
+            </a:endParaRPr>
+          </a:p>
+        </p:txBody>
+      </p:sp>
+      <p:cxnSp>
+        <p:nvCxnSpPr>
+          <p:cNvPr id="11" name="Conector recto 10">
+            <a:extLst>
+              <a:ext uri="{FF2B5EF4-FFF2-40B4-BE49-F238E27FC236}">
+                <a16:creationId xmlns:a16="http://schemas.microsoft.com/office/drawing/2014/main" id="{36A6FBAF-87B2-A59A-F408-04D97B15A954}"/>
+              </a:ext>
+            </a:extLst>
+          </p:cNvPr>
+          <p:cNvCxnSpPr>
+            <a:cxnSpLocks/>
+          </p:cNvCxnSpPr>
+          <p:nvPr/>
+        </p:nvCxnSpPr>
+        <p:spPr>
+          <a:xfrm>
+            <a:off x="8829040" y="1480000"/>
+            <a:ext cx="0" cy="4463098"/>
+          </a:xfrm>
+          <a:prstGeom prst="line">
+            <a:avLst/>
+          </a:prstGeom>
+          <a:ln>
+            <a:solidFill>
+              <a:schemeClr val="accent4">
+                <a:lumMod val="50000"/>
+              </a:schemeClr>
+            </a:solidFill>
+          </a:ln>
+        </p:spPr>
+        <p:style>
+          <a:lnRef idx="1">
+            <a:schemeClr val="accent1"/>
+          </a:lnRef>
+          <a:fillRef idx="0">
+            <a:schemeClr val="accent1"/>
+          </a:fillRef>
+          <a:effectRef idx="0">
+            <a:schemeClr val="accent1"/>
+          </a:effectRef>
+          <a:fontRef idx="minor">
+            <a:schemeClr val="tx1"/>
+          </a:fontRef>
+        </p:style>
+      </p:cxnSp>
+      <p:sp>
+        <p:nvSpPr>
+          <p:cNvPr id="14" name="CuadroTexto 13">
+            <a:extLst>
+              <a:ext uri="{FF2B5EF4-FFF2-40B4-BE49-F238E27FC236}">
+                <a16:creationId xmlns:a16="http://schemas.microsoft.com/office/drawing/2014/main" id="{689653A0-DA91-01F4-D819-55778283154F}"/>
+              </a:ext>
+            </a:extLst>
+          </p:cNvPr>
+          <p:cNvSpPr txBox="1"/>
+          <p:nvPr/>
+        </p:nvSpPr>
+        <p:spPr>
+          <a:xfrm>
+            <a:off x="9146880" y="1492413"/>
+            <a:ext cx="2573330" cy="369332"/>
+          </a:xfrm>
+          <a:prstGeom prst="rect">
+            <a:avLst/>
+          </a:prstGeom>
+          <a:noFill/>
+        </p:spPr>
+        <p:txBody>
+          <a:bodyPr wrap="square" rtlCol="0">
+            <a:spAutoFit/>
+          </a:bodyPr>
+          <a:lstStyle/>
+          <a:p>
+            <a:pPr marL="285750" indent="-285750">
+              <a:buFont typeface="Arial" panose="020B0604020202020204" pitchFamily="34" charset="0"/>
+              <a:buChar char="•"/>
+            </a:pPr>
+            <a:r>
+              <a:rPr lang="es-ES" dirty="0">
+                <a:solidFill>
+                  <a:schemeClr val="accent4">
+                    <a:lumMod val="50000"/>
+                  </a:schemeClr>
+                </a:solidFill>
+              </a:rPr>
+              <a:t>OTRAS</a:t>
+            </a:r>
+          </a:p>
+        </p:txBody>
+      </p:sp>
+      <p:pic>
+        <p:nvPicPr>
+          <p:cNvPr id="16" name="Imagen 15">
+            <a:extLst>
+              <a:ext uri="{FF2B5EF4-FFF2-40B4-BE49-F238E27FC236}">
+                <a16:creationId xmlns:a16="http://schemas.microsoft.com/office/drawing/2014/main" id="{E0851495-23DD-D755-D866-72C1D4D27F09}"/>
+              </a:ext>
+            </a:extLst>
+          </p:cNvPr>
+          <p:cNvPicPr>
+            <a:picLocks noChangeAspect="1"/>
+          </p:cNvPicPr>
+          <p:nvPr/>
+        </p:nvPicPr>
+        <p:blipFill>
+          <a:blip r:embed="rId4"/>
+          <a:stretch>
+            <a:fillRect/>
+          </a:stretch>
+        </p:blipFill>
+        <p:spPr>
+          <a:xfrm>
+            <a:off x="9905352" y="2010277"/>
+            <a:ext cx="1046267" cy="481756"/>
+          </a:xfrm>
+          <a:prstGeom prst="rect">
+            <a:avLst/>
+          </a:prstGeom>
+        </p:spPr>
+      </p:pic>
+      <p:pic>
+        <p:nvPicPr>
+          <p:cNvPr id="18" name="Imagen 17">
+            <a:extLst>
+              <a:ext uri="{FF2B5EF4-FFF2-40B4-BE49-F238E27FC236}">
+                <a16:creationId xmlns:a16="http://schemas.microsoft.com/office/drawing/2014/main" id="{47ED6B0E-1C07-E014-F3CC-9E8C5A105E9C}"/>
+              </a:ext>
+            </a:extLst>
+          </p:cNvPr>
+          <p:cNvPicPr>
+            <a:picLocks noChangeAspect="1"/>
+          </p:cNvPicPr>
+          <p:nvPr/>
+        </p:nvPicPr>
+        <p:blipFill>
+          <a:blip r:embed="rId5"/>
+          <a:stretch>
+            <a:fillRect/>
+          </a:stretch>
+        </p:blipFill>
+        <p:spPr>
+          <a:xfrm>
+            <a:off x="9876992" y="2731698"/>
+            <a:ext cx="1353413" cy="654495"/>
+          </a:xfrm>
+          <a:prstGeom prst="rect">
+            <a:avLst/>
+          </a:prstGeom>
+        </p:spPr>
+      </p:pic>
+      <p:pic>
+        <p:nvPicPr>
+          <p:cNvPr id="20" name="Imagen 19">
+            <a:extLst>
+              <a:ext uri="{FF2B5EF4-FFF2-40B4-BE49-F238E27FC236}">
+                <a16:creationId xmlns:a16="http://schemas.microsoft.com/office/drawing/2014/main" id="{2F63C93C-A097-2726-61CF-B6C67DFDEF02}"/>
+              </a:ext>
+            </a:extLst>
+          </p:cNvPr>
+          <p:cNvPicPr>
+            <a:picLocks noChangeAspect="1"/>
+          </p:cNvPicPr>
+          <p:nvPr/>
+        </p:nvPicPr>
+        <p:blipFill>
+          <a:blip r:embed="rId6"/>
+          <a:stretch>
+            <a:fillRect/>
+          </a:stretch>
+        </p:blipFill>
+        <p:spPr>
+          <a:xfrm>
+            <a:off x="9624880" y="3668175"/>
+            <a:ext cx="1857636" cy="476317"/>
+          </a:xfrm>
+          <a:prstGeom prst="rect">
+            <a:avLst/>
+          </a:prstGeom>
+        </p:spPr>
+      </p:pic>
+      <p:pic>
+        <p:nvPicPr>
+          <p:cNvPr id="22" name="Imagen 21">
+            <a:extLst>
+              <a:ext uri="{FF2B5EF4-FFF2-40B4-BE49-F238E27FC236}">
+                <a16:creationId xmlns:a16="http://schemas.microsoft.com/office/drawing/2014/main" id="{A1CFB87A-DFF2-18AA-C6AC-A0DF298C3C9A}"/>
+              </a:ext>
+            </a:extLst>
+          </p:cNvPr>
+          <p:cNvPicPr>
+            <a:picLocks noChangeAspect="1"/>
+          </p:cNvPicPr>
+          <p:nvPr/>
+        </p:nvPicPr>
+        <p:blipFill>
+          <a:blip r:embed="rId7"/>
+          <a:stretch>
+            <a:fillRect/>
+          </a:stretch>
+        </p:blipFill>
+        <p:spPr>
+          <a:xfrm>
+            <a:off x="9754643" y="4458019"/>
+            <a:ext cx="1598109" cy="907568"/>
           </a:xfrm>
           <a:prstGeom prst="rect">
             <a:avLst/>
@@ -4690,7 +4981,7 @@
     </p:spTree>
     <p:extLst>
       <p:ext uri="{BB962C8B-B14F-4D97-AF65-F5344CB8AC3E}">
-        <p14:creationId xmlns:p14="http://schemas.microsoft.com/office/powerpoint/2010/main" val="949406214"/>
+        <p14:creationId xmlns:p14="http://schemas.microsoft.com/office/powerpoint/2010/main" val="3603358359"/>
       </p:ext>
     </p:extLst>
   </p:cSld>
@@ -4722,7 +5013,7 @@
           <p:cNvPr id="2" name="Título 1">
             <a:extLst>
               <a:ext uri="{FF2B5EF4-FFF2-40B4-BE49-F238E27FC236}">
-                <a16:creationId xmlns:a16="http://schemas.microsoft.com/office/drawing/2014/main" id="{0E436F96-FF4B-D0E5-DA2F-D1B04BAA5B51}"/>
+                <a16:creationId xmlns:a16="http://schemas.microsoft.com/office/drawing/2014/main" id="{3A624165-7A81-6F78-DBE0-AF5548D05789}"/>
               </a:ext>
             </a:extLst>
           </p:cNvPr>
@@ -4733,7 +5024,12 @@
             <p:ph type="title"/>
           </p:nvPr>
         </p:nvSpPr>
-        <p:spPr/>
+        <p:spPr>
+          <a:xfrm>
+            <a:off x="135885" y="209471"/>
+            <a:ext cx="8915402" cy="1371600"/>
+          </a:xfrm>
+        </p:spPr>
         <p:txBody>
           <a:bodyPr/>
           <a:lstStyle/>
@@ -4746,7 +5042,7 @@
                   </a:schemeClr>
                 </a:solidFill>
               </a:rPr>
-              <a:t>TECNOLOGÍAS A UTILIZAR</a:t>
+              <a:t>MODELO DE DATOS</a:t>
             </a:r>
           </a:p>
         </p:txBody>
@@ -4756,7 +5052,7 @@
           <p:cNvPr id="3" name="Marcador de contenido 2">
             <a:extLst>
               <a:ext uri="{FF2B5EF4-FFF2-40B4-BE49-F238E27FC236}">
-                <a16:creationId xmlns:a16="http://schemas.microsoft.com/office/drawing/2014/main" id="{16639217-463C-264A-5151-9B08157441F4}"/>
+                <a16:creationId xmlns:a16="http://schemas.microsoft.com/office/drawing/2014/main" id="{79DDAEA0-4AD1-47AE-77B8-48A2BC711BFE}"/>
               </a:ext>
             </a:extLst>
           </p:cNvPr>
@@ -4767,24 +5063,19 @@
             <p:ph idx="1"/>
           </p:nvPr>
         </p:nvSpPr>
-        <p:spPr/>
+        <p:spPr>
+          <a:xfrm>
+            <a:off x="1638298" y="2057399"/>
+            <a:ext cx="8915402" cy="4137259"/>
+          </a:xfrm>
+        </p:spPr>
         <p:txBody>
           <a:bodyPr/>
           <a:lstStyle/>
           <a:p>
-            <a:r>
-              <a:rPr lang="es-ES" dirty="0">
-                <a:solidFill>
-                  <a:schemeClr val="accent4">
-                    <a:lumMod val="50000"/>
-                  </a:schemeClr>
-                </a:solidFill>
-              </a:rPr>
-              <a:t>ANGULAR</a:t>
-            </a:r>
-          </a:p>
-          <a:p>
-            <a:pPr lvl="1"/>
+            <a:pPr marL="502920" lvl="2" indent="0" algn="ctr">
+              <a:buNone/>
+            </a:pPr>
             <a:endParaRPr lang="es-ES" dirty="0">
               <a:solidFill>
                 <a:schemeClr val="accent4">
@@ -4793,53 +5084,178 @@
               </a:solidFill>
             </a:endParaRPr>
           </a:p>
-          <a:p>
-            <a:endParaRPr lang="es-ES" dirty="0">
-              <a:solidFill>
-                <a:schemeClr val="accent4">
-                  <a:lumMod val="50000"/>
-                </a:schemeClr>
-              </a:solidFill>
-            </a:endParaRPr>
-          </a:p>
-          <a:p>
-            <a:endParaRPr lang="es-ES" dirty="0">
-              <a:solidFill>
-                <a:schemeClr val="accent4">
-                  <a:lumMod val="50000"/>
-                </a:schemeClr>
-              </a:solidFill>
-            </a:endParaRPr>
-          </a:p>
-          <a:p>
-            <a:endParaRPr lang="es-ES" dirty="0">
-              <a:solidFill>
-                <a:schemeClr val="accent4">
-                  <a:lumMod val="50000"/>
-                </a:schemeClr>
-              </a:solidFill>
-            </a:endParaRPr>
-          </a:p>
-          <a:p>
-            <a:r>
-              <a:rPr lang="es-ES" dirty="0">
+        </p:txBody>
+      </p:sp>
+      <p:sp>
+        <p:nvSpPr>
+          <p:cNvPr id="4" name="CuadroTexto 3">
+            <a:extLst>
+              <a:ext uri="{FF2B5EF4-FFF2-40B4-BE49-F238E27FC236}">
+                <a16:creationId xmlns:a16="http://schemas.microsoft.com/office/drawing/2014/main" id="{5F816DFB-09E2-D888-7BA7-569F59AD1A86}"/>
+              </a:ext>
+            </a:extLst>
+          </p:cNvPr>
+          <p:cNvSpPr txBox="1"/>
+          <p:nvPr/>
+        </p:nvSpPr>
+        <p:spPr>
+          <a:xfrm>
+            <a:off x="5558920" y="2411834"/>
+            <a:ext cx="2722880" cy="369332"/>
+          </a:xfrm>
+          <a:prstGeom prst="rect">
+            <a:avLst/>
+          </a:prstGeom>
+          <a:noFill/>
+        </p:spPr>
+        <p:txBody>
+          <a:bodyPr wrap="square" rtlCol="0">
+            <a:spAutoFit/>
+          </a:bodyPr>
+          <a:lstStyle/>
+          <a:p>
+            <a:r>
+              <a:rPr lang="es-ES" b="1" dirty="0">
                 <a:solidFill>
                   <a:schemeClr val="accent4">
                     <a:lumMod val="50000"/>
                   </a:schemeClr>
                 </a:solidFill>
               </a:rPr>
-              <a:t>FIREBASE</a:t>
+              <a:t>ADMINISTRADORES</a:t>
+            </a:r>
+          </a:p>
+        </p:txBody>
+      </p:sp>
+      <p:sp>
+        <p:nvSpPr>
+          <p:cNvPr id="5" name="CuadroTexto 4">
+            <a:extLst>
+              <a:ext uri="{FF2B5EF4-FFF2-40B4-BE49-F238E27FC236}">
+                <a16:creationId xmlns:a16="http://schemas.microsoft.com/office/drawing/2014/main" id="{936EAC21-8C11-1A79-B2E1-D681BBBD2D3A}"/>
+              </a:ext>
+            </a:extLst>
+          </p:cNvPr>
+          <p:cNvSpPr txBox="1"/>
+          <p:nvPr/>
+        </p:nvSpPr>
+        <p:spPr>
+          <a:xfrm>
+            <a:off x="445242" y="4788777"/>
+            <a:ext cx="2367280" cy="369332"/>
+          </a:xfrm>
+          <a:prstGeom prst="rect">
+            <a:avLst/>
+          </a:prstGeom>
+          <a:noFill/>
+        </p:spPr>
+        <p:txBody>
+          <a:bodyPr wrap="square" rtlCol="0">
+            <a:spAutoFit/>
+          </a:bodyPr>
+          <a:lstStyle/>
+          <a:p>
+            <a:r>
+              <a:rPr lang="es-ES" b="1" dirty="0">
+                <a:solidFill>
+                  <a:schemeClr val="accent4">
+                    <a:lumMod val="50000"/>
+                  </a:schemeClr>
+                </a:solidFill>
+              </a:rPr>
+              <a:t>RESERVAS</a:t>
+            </a:r>
+          </a:p>
+        </p:txBody>
+      </p:sp>
+      <p:sp>
+        <p:nvSpPr>
+          <p:cNvPr id="6" name="CuadroTexto 5">
+            <a:extLst>
+              <a:ext uri="{FF2B5EF4-FFF2-40B4-BE49-F238E27FC236}">
+                <a16:creationId xmlns:a16="http://schemas.microsoft.com/office/drawing/2014/main" id="{6A2F8BA0-3D5B-EF61-3540-3C20B3FCD95C}"/>
+              </a:ext>
+            </a:extLst>
+          </p:cNvPr>
+          <p:cNvSpPr txBox="1"/>
+          <p:nvPr/>
+        </p:nvSpPr>
+        <p:spPr>
+          <a:xfrm>
+            <a:off x="849568" y="2449677"/>
+            <a:ext cx="1000764" cy="369332"/>
+          </a:xfrm>
+          <a:prstGeom prst="rect">
+            <a:avLst/>
+          </a:prstGeom>
+          <a:noFill/>
+        </p:spPr>
+        <p:txBody>
+          <a:bodyPr wrap="square" rtlCol="0">
+            <a:spAutoFit/>
+          </a:bodyPr>
+          <a:lstStyle/>
+          <a:p>
+            <a:r>
+              <a:rPr lang="es-ES" b="1" dirty="0">
+                <a:solidFill>
+                  <a:schemeClr val="accent4">
+                    <a:lumMod val="50000"/>
+                  </a:schemeClr>
+                </a:solidFill>
+              </a:rPr>
+              <a:t>AULAS</a:t>
+            </a:r>
+          </a:p>
+        </p:txBody>
+      </p:sp>
+      <p:sp>
+        <p:nvSpPr>
+          <p:cNvPr id="7" name="CuadroTexto 6">
+            <a:extLst>
+              <a:ext uri="{FF2B5EF4-FFF2-40B4-BE49-F238E27FC236}">
+                <a16:creationId xmlns:a16="http://schemas.microsoft.com/office/drawing/2014/main" id="{685A214C-2E24-D177-1F61-74BF56DD0C60}"/>
+              </a:ext>
+            </a:extLst>
+          </p:cNvPr>
+          <p:cNvSpPr txBox="1"/>
+          <p:nvPr/>
+        </p:nvSpPr>
+        <p:spPr>
+          <a:xfrm>
+            <a:off x="6328407" y="5158109"/>
+            <a:ext cx="2722880" cy="369332"/>
+          </a:xfrm>
+          <a:prstGeom prst="rect">
+            <a:avLst/>
+          </a:prstGeom>
+          <a:noFill/>
+        </p:spPr>
+        <p:txBody>
+          <a:bodyPr wrap="square" rtlCol="0">
+            <a:spAutoFit/>
+          </a:bodyPr>
+          <a:lstStyle/>
+          <a:p>
+            <a:r>
+              <a:rPr lang="es-ES" b="1" dirty="0">
+                <a:solidFill>
+                  <a:schemeClr val="accent4">
+                    <a:lumMod val="50000"/>
+                  </a:schemeClr>
+                </a:solidFill>
+              </a:rPr>
+              <a:t>USUARIOS</a:t>
             </a:r>
           </a:p>
         </p:txBody>
       </p:sp>
       <p:pic>
         <p:nvPicPr>
-          <p:cNvPr id="5" name="Imagen 4">
-            <a:extLst>
-              <a:ext uri="{FF2B5EF4-FFF2-40B4-BE49-F238E27FC236}">
-                <a16:creationId xmlns:a16="http://schemas.microsoft.com/office/drawing/2014/main" id="{520C4763-7558-5E84-BFBC-F01F90909AB8}"/>
+          <p:cNvPr id="9" name="Imagen 8">
+            <a:extLst>
+              <a:ext uri="{FF2B5EF4-FFF2-40B4-BE49-F238E27FC236}">
+                <a16:creationId xmlns:a16="http://schemas.microsoft.com/office/drawing/2014/main" id="{02A6C9EE-9EE4-7A4C-15F7-CC91DC5FDC8D}"/>
               </a:ext>
             </a:extLst>
           </p:cNvPr>
@@ -4856,8 +5272,8 @@
         </p:blipFill>
         <p:spPr>
           <a:xfrm>
-            <a:off x="5248192" y="2278866"/>
-            <a:ext cx="1695616" cy="1519272"/>
+            <a:off x="8080745" y="4126028"/>
+            <a:ext cx="3154879" cy="2522501"/>
           </a:xfrm>
           <a:prstGeom prst="rect">
             <a:avLst/>
@@ -4866,10 +5282,10 @@
       </p:pic>
       <p:pic>
         <p:nvPicPr>
-          <p:cNvPr id="7" name="Imagen 6">
-            <a:extLst>
-              <a:ext uri="{FF2B5EF4-FFF2-40B4-BE49-F238E27FC236}">
-                <a16:creationId xmlns:a16="http://schemas.microsoft.com/office/drawing/2014/main" id="{BE9A92AC-8C02-78DA-7020-B100DD03F715}"/>
+          <p:cNvPr id="11" name="Imagen 10">
+            <a:extLst>
+              <a:ext uri="{FF2B5EF4-FFF2-40B4-BE49-F238E27FC236}">
+                <a16:creationId xmlns:a16="http://schemas.microsoft.com/office/drawing/2014/main" id="{925B2946-CD7A-EC51-55EF-29349AB5FEE3}"/>
               </a:ext>
             </a:extLst>
           </p:cNvPr>
@@ -4886,178 +5302,78 @@
         </p:blipFill>
         <p:spPr>
           <a:xfrm>
-            <a:off x="3490164" y="4752149"/>
-            <a:ext cx="3572374" cy="1419423"/>
+            <a:off x="8080745" y="1409566"/>
+            <a:ext cx="3154879" cy="2226914"/>
           </a:xfrm>
           <a:prstGeom prst="rect">
             <a:avLst/>
           </a:prstGeom>
         </p:spPr>
       </p:pic>
-      <p:sp>
-        <p:nvSpPr>
-          <p:cNvPr id="8" name="Abrir llave 7">
-            <a:extLst>
-              <a:ext uri="{FF2B5EF4-FFF2-40B4-BE49-F238E27FC236}">
-                <a16:creationId xmlns:a16="http://schemas.microsoft.com/office/drawing/2014/main" id="{BFF8C844-1369-340E-41E4-09FF5EE0AF98}"/>
-              </a:ext>
-            </a:extLst>
-          </p:cNvPr>
-          <p:cNvSpPr/>
+      <p:pic>
+        <p:nvPicPr>
+          <p:cNvPr id="13" name="Imagen 12">
+            <a:extLst>
+              <a:ext uri="{FF2B5EF4-FFF2-40B4-BE49-F238E27FC236}">
+                <a16:creationId xmlns:a16="http://schemas.microsoft.com/office/drawing/2014/main" id="{8E23B93F-60F7-F3BE-2C94-8F8D88D781B2}"/>
+              </a:ext>
+            </a:extLst>
+          </p:cNvPr>
+          <p:cNvPicPr>
+            <a:picLocks noChangeAspect="1"/>
+          </p:cNvPicPr>
           <p:nvPr/>
-        </p:nvSpPr>
-        <p:spPr>
-          <a:xfrm>
-            <a:off x="6943808" y="4362449"/>
-            <a:ext cx="1014413" cy="2198822"/>
-          </a:xfrm>
-          <a:prstGeom prst="leftBrace">
-            <a:avLst/>
-          </a:prstGeom>
-          <a:ln>
-            <a:solidFill>
-              <a:schemeClr val="accent4">
-                <a:lumMod val="50000"/>
-              </a:schemeClr>
-            </a:solidFill>
-          </a:ln>
-        </p:spPr>
-        <p:style>
-          <a:lnRef idx="1">
-            <a:schemeClr val="accent1"/>
-          </a:lnRef>
-          <a:fillRef idx="0">
-            <a:schemeClr val="accent1"/>
-          </a:fillRef>
-          <a:effectRef idx="0">
-            <a:schemeClr val="accent1"/>
-          </a:effectRef>
-          <a:fontRef idx="minor">
-            <a:schemeClr val="tx1"/>
-          </a:fontRef>
-        </p:style>
-        <p:txBody>
-          <a:bodyPr rtlCol="0" anchor="ctr"/>
-          <a:lstStyle/>
-          <a:p>
-            <a:pPr algn="ctr"/>
-            <a:endParaRPr lang="es-ES">
-              <a:solidFill>
-                <a:schemeClr val="accent4">
-                  <a:lumMod val="50000"/>
-                </a:schemeClr>
-              </a:solidFill>
-            </a:endParaRPr>
-          </a:p>
-        </p:txBody>
-      </p:sp>
-      <p:sp>
-        <p:nvSpPr>
-          <p:cNvPr id="9" name="CuadroTexto 8">
-            <a:extLst>
-              <a:ext uri="{FF2B5EF4-FFF2-40B4-BE49-F238E27FC236}">
-                <a16:creationId xmlns:a16="http://schemas.microsoft.com/office/drawing/2014/main" id="{6A0D3FD2-6171-6EE6-3E99-E09D915F36ED}"/>
-              </a:ext>
-            </a:extLst>
-          </p:cNvPr>
-          <p:cNvSpPr txBox="1"/>
-          <p:nvPr/>
-        </p:nvSpPr>
-        <p:spPr>
-          <a:xfrm>
-            <a:off x="7942852" y="4752149"/>
-            <a:ext cx="2573330" cy="1477328"/>
+        </p:nvPicPr>
+        <p:blipFill>
+          <a:blip r:embed="rId4"/>
+          <a:stretch>
+            <a:fillRect/>
+          </a:stretch>
+        </p:blipFill>
+        <p:spPr>
+          <a:xfrm>
+            <a:off x="1779442" y="1438107"/>
+            <a:ext cx="3328586" cy="2687921"/>
           </a:xfrm>
           <a:prstGeom prst="rect">
             <a:avLst/>
           </a:prstGeom>
-          <a:noFill/>
-        </p:spPr>
-        <p:txBody>
-          <a:bodyPr wrap="square" rtlCol="0">
-            <a:spAutoFit/>
-          </a:bodyPr>
-          <a:lstStyle/>
-          <a:p>
-            <a:pPr marL="285750" indent="-285750">
-              <a:buFont typeface="Arial" panose="020B0604020202020204" pitchFamily="34" charset="0"/>
-              <a:buChar char="•"/>
-            </a:pPr>
-            <a:r>
-              <a:rPr lang="es-ES" dirty="0">
-                <a:solidFill>
-                  <a:schemeClr val="accent4">
-                    <a:lumMod val="50000"/>
-                  </a:schemeClr>
-                </a:solidFill>
-              </a:rPr>
-              <a:t>FIRESTORE BBDD</a:t>
-            </a:r>
-          </a:p>
-          <a:p>
-            <a:pPr marL="285750" indent="-285750">
-              <a:buFont typeface="Arial" panose="020B0604020202020204" pitchFamily="34" charset="0"/>
-              <a:buChar char="•"/>
-            </a:pPr>
-            <a:endParaRPr lang="es-ES" dirty="0">
-              <a:solidFill>
-                <a:schemeClr val="accent4">
-                  <a:lumMod val="50000"/>
-                </a:schemeClr>
-              </a:solidFill>
-            </a:endParaRPr>
-          </a:p>
-          <a:p>
-            <a:pPr marL="285750" indent="-285750">
-              <a:buFont typeface="Arial" panose="020B0604020202020204" pitchFamily="34" charset="0"/>
-              <a:buChar char="•"/>
-            </a:pPr>
-            <a:r>
-              <a:rPr lang="es-ES" dirty="0">
-                <a:solidFill>
-                  <a:schemeClr val="accent4">
-                    <a:lumMod val="50000"/>
-                  </a:schemeClr>
-                </a:solidFill>
-              </a:rPr>
-              <a:t>AUTHENTICATION</a:t>
-            </a:r>
-          </a:p>
-          <a:p>
-            <a:pPr marL="285750" indent="-285750">
-              <a:buFont typeface="Arial" panose="020B0604020202020204" pitchFamily="34" charset="0"/>
-              <a:buChar char="•"/>
-            </a:pPr>
-            <a:endParaRPr lang="es-ES" dirty="0">
-              <a:solidFill>
-                <a:schemeClr val="accent4">
-                  <a:lumMod val="50000"/>
-                </a:schemeClr>
-              </a:solidFill>
-            </a:endParaRPr>
-          </a:p>
-          <a:p>
-            <a:pPr marL="285750" indent="-285750">
-              <a:buFont typeface="Arial" panose="020B0604020202020204" pitchFamily="34" charset="0"/>
-              <a:buChar char="•"/>
-            </a:pPr>
-            <a:r>
-              <a:rPr lang="es-ES" dirty="0">
-                <a:solidFill>
-                  <a:schemeClr val="accent4">
-                    <a:lumMod val="50000"/>
-                  </a:schemeClr>
-                </a:solidFill>
-              </a:rPr>
-              <a:t>HOSTING</a:t>
-            </a:r>
-          </a:p>
-        </p:txBody>
-      </p:sp>
+        </p:spPr>
+      </p:pic>
+      <p:pic>
+        <p:nvPicPr>
+          <p:cNvPr id="15" name="Imagen 14">
+            <a:extLst>
+              <a:ext uri="{FF2B5EF4-FFF2-40B4-BE49-F238E27FC236}">
+                <a16:creationId xmlns:a16="http://schemas.microsoft.com/office/drawing/2014/main" id="{CBD9D139-EEAE-8456-BDA0-06FFE902115B}"/>
+              </a:ext>
+            </a:extLst>
+          </p:cNvPr>
+          <p:cNvPicPr>
+            <a:picLocks noChangeAspect="1"/>
+          </p:cNvPicPr>
+          <p:nvPr/>
+        </p:nvPicPr>
+        <p:blipFill>
+          <a:blip r:embed="rId5"/>
+          <a:stretch>
+            <a:fillRect/>
+          </a:stretch>
+        </p:blipFill>
+        <p:spPr>
+          <a:xfrm>
+            <a:off x="1754338" y="4247928"/>
+            <a:ext cx="3353690" cy="2401410"/>
+          </a:xfrm>
+          <a:prstGeom prst="rect">
+            <a:avLst/>
+          </a:prstGeom>
+        </p:spPr>
+      </p:pic>
     </p:spTree>
     <p:extLst>
       <p:ext uri="{BB962C8B-B14F-4D97-AF65-F5344CB8AC3E}">
-        <p14:creationId xmlns:p14="http://schemas.microsoft.com/office/powerpoint/2010/main" val="3603358359"/>
+        <p14:creationId xmlns:p14="http://schemas.microsoft.com/office/powerpoint/2010/main" val="1194157803"/>
       </p:ext>
     </p:extLst>
   </p:cSld>
@@ -5350,7 +5666,7 @@
           <p:cNvPr id="2" name="Título 1">
             <a:extLst>
               <a:ext uri="{FF2B5EF4-FFF2-40B4-BE49-F238E27FC236}">
-                <a16:creationId xmlns:a16="http://schemas.microsoft.com/office/drawing/2014/main" id="{2DB8669E-3727-EFDA-A6BD-129B68E19A23}"/>
+                <a16:creationId xmlns:a16="http://schemas.microsoft.com/office/drawing/2014/main" id="{9485D152-4A36-26D1-80DF-76D21212D99D}"/>
               </a:ext>
             </a:extLst>
           </p:cNvPr>
@@ -5361,16 +5677,9 @@
             <p:ph type="title"/>
           </p:nvPr>
         </p:nvSpPr>
-        <p:spPr>
-          <a:xfrm>
-            <a:off x="798173" y="403798"/>
-            <a:ext cx="7553347" cy="1244765"/>
-          </a:xfrm>
-        </p:spPr>
-        <p:txBody>
-          <a:bodyPr>
-            <a:normAutofit/>
-          </a:bodyPr>
+        <p:spPr/>
+        <p:txBody>
+          <a:bodyPr/>
           <a:lstStyle/>
           <a:p>
             <a:r>
@@ -5381,17 +5690,17 @@
                   </a:schemeClr>
                 </a:solidFill>
               </a:rPr>
-              <a:t>ESTRUCTURA DE LA APLICACIÓN</a:t>
+              <a:t>DEMOSTRACIÓN</a:t>
             </a:r>
           </a:p>
         </p:txBody>
       </p:sp>
       <p:pic>
         <p:nvPicPr>
-          <p:cNvPr id="4" name="Marcador de contenido 3">
-            <a:extLst>
-              <a:ext uri="{FF2B5EF4-FFF2-40B4-BE49-F238E27FC236}">
-                <a16:creationId xmlns:a16="http://schemas.microsoft.com/office/drawing/2014/main" id="{36A340B4-2B12-805F-B016-093340D4927C}"/>
+          <p:cNvPr id="5" name="Marcador de contenido 4">
+            <a:extLst>
+              <a:ext uri="{FF2B5EF4-FFF2-40B4-BE49-F238E27FC236}">
+                <a16:creationId xmlns:a16="http://schemas.microsoft.com/office/drawing/2014/main" id="{E7256F20-8378-0B50-1591-C64F4B056570}"/>
               </a:ext>
             </a:extLst>
           </p:cNvPr>
@@ -5402,76 +5711,23 @@
             <p:ph idx="1"/>
           </p:nvPr>
         </p:nvPicPr>
-        <p:blipFill rotWithShape="1">
-          <a:blip r:embed="rId2">
-            <a:extLst>
-              <a:ext uri="{28A0092B-C50C-407E-A947-70E740481C1C}">
-                <a14:useLocalDpi xmlns:a14="http://schemas.microsoft.com/office/drawing/2010/main" val="0"/>
-              </a:ext>
-            </a:extLst>
-          </a:blip>
-          <a:srcRect r="-1" b="12471"/>
-          <a:stretch/>
+        <p:blipFill>
+          <a:blip r:embed="rId2"/>
+          <a:stretch>
+            <a:fillRect/>
+          </a:stretch>
         </p:blipFill>
         <p:spPr>
           <a:xfrm>
-            <a:off x="912838" y="1474826"/>
-            <a:ext cx="10366324" cy="5209437"/>
-          </a:xfrm>
-          <a:prstGeom prst="rect">
-            <a:avLst/>
-          </a:prstGeom>
-          <a:noFill/>
+            <a:off x="1638300" y="2074655"/>
+            <a:ext cx="8915400" cy="4102515"/>
+          </a:xfrm>
         </p:spPr>
       </p:pic>
-      <p:sp>
-        <p:nvSpPr>
-          <p:cNvPr id="15" name="Slide Number Placeholder 5">
-            <a:extLst>
-              <a:ext uri="{FF2B5EF4-FFF2-40B4-BE49-F238E27FC236}">
-                <a16:creationId xmlns:a16="http://schemas.microsoft.com/office/drawing/2014/main" id="{3109FE0B-0AFC-4929-8515-CCE334CA89A5}"/>
-              </a:ext>
-            </a:extLst>
-          </p:cNvPr>
-          <p:cNvSpPr>
-            <a:spLocks noGrp="1"/>
-          </p:cNvSpPr>
-          <p:nvPr>
-            <p:ph type="sldNum" sz="quarter" idx="12"/>
-          </p:nvPr>
-        </p:nvSpPr>
-        <p:spPr>
-          <a:xfrm>
-            <a:off x="11228877" y="6319138"/>
-            <a:ext cx="710647" cy="365125"/>
-          </a:xfrm>
-        </p:spPr>
-        <p:txBody>
-          <a:bodyPr/>
-          <a:lstStyle/>
-          <a:p>
-            <a:pPr>
-              <a:spcAft>
-                <a:spcPts val="600"/>
-              </a:spcAft>
-            </a:pPr>
-            <a:fld id="{C15563AB-8317-4F4A-8C10-D6F570F02A77}" type="slidenum">
-              <a:rPr lang="en-US" smtClean="0"/>
-              <a:pPr>
-                <a:spcAft>
-                  <a:spcPts val="600"/>
-                </a:spcAft>
-              </a:pPr>
-              <a:t>8</a:t>
-            </a:fld>
-            <a:endParaRPr lang="en-US"/>
-          </a:p>
-        </p:txBody>
-      </p:sp>
     </p:spTree>
     <p:extLst>
       <p:ext uri="{BB962C8B-B14F-4D97-AF65-F5344CB8AC3E}">
-        <p14:creationId xmlns:p14="http://schemas.microsoft.com/office/powerpoint/2010/main" val="811035019"/>
+        <p14:creationId xmlns:p14="http://schemas.microsoft.com/office/powerpoint/2010/main" val="330679039"/>
       </p:ext>
     </p:extLst>
   </p:cSld>
@@ -5503,7 +5759,7 @@
           <p:cNvPr id="2" name="Título 1">
             <a:extLst>
               <a:ext uri="{FF2B5EF4-FFF2-40B4-BE49-F238E27FC236}">
-                <a16:creationId xmlns:a16="http://schemas.microsoft.com/office/drawing/2014/main" id="{9485D152-4A36-26D1-80DF-76D21212D99D}"/>
+                <a16:creationId xmlns:a16="http://schemas.microsoft.com/office/drawing/2014/main" id="{7DB7CBDD-40C8-1EC9-C46C-24587E8CE4ED}"/>
               </a:ext>
             </a:extLst>
           </p:cNvPr>
@@ -5527,26 +5783,94 @@
                   </a:schemeClr>
                 </a:solidFill>
               </a:rPr>
-              <a:t>DEMOSTRACIÓN</a:t>
+              <a:t>MEJORAS A FUTURO</a:t>
+            </a:r>
+          </a:p>
+        </p:txBody>
+      </p:sp>
+      <p:sp>
+        <p:nvSpPr>
+          <p:cNvPr id="3" name="Marcador de contenido 2">
+            <a:extLst>
+              <a:ext uri="{FF2B5EF4-FFF2-40B4-BE49-F238E27FC236}">
+                <a16:creationId xmlns:a16="http://schemas.microsoft.com/office/drawing/2014/main" id="{C3B50C2C-649B-F378-ACC2-4FA8FE2DF966}"/>
+              </a:ext>
+            </a:extLst>
+          </p:cNvPr>
+          <p:cNvSpPr>
+            <a:spLocks noGrp="1"/>
+          </p:cNvSpPr>
+          <p:nvPr>
+            <p:ph idx="1"/>
+          </p:nvPr>
+        </p:nvSpPr>
+        <p:spPr/>
+        <p:txBody>
+          <a:bodyPr/>
+          <a:lstStyle/>
+          <a:p>
+            <a:r>
+              <a:rPr lang="es-ES" dirty="0">
+                <a:solidFill>
+                  <a:schemeClr val="accent4">
+                    <a:lumMod val="50000"/>
+                  </a:schemeClr>
+                </a:solidFill>
+              </a:rPr>
+              <a:t>NOTIFICACIÓN POR EMAIL</a:t>
+            </a:r>
+          </a:p>
+          <a:p>
+            <a:r>
+              <a:rPr lang="es-ES" dirty="0">
+                <a:solidFill>
+                  <a:schemeClr val="accent4">
+                    <a:lumMod val="50000"/>
+                  </a:schemeClr>
+                </a:solidFill>
+              </a:rPr>
+              <a:t>LISTA DE ESPERA</a:t>
+            </a:r>
+          </a:p>
+          <a:p>
+            <a:r>
+              <a:rPr lang="es-ES" dirty="0">
+                <a:solidFill>
+                  <a:schemeClr val="accent4">
+                    <a:lumMod val="50000"/>
+                  </a:schemeClr>
+                </a:solidFill>
+              </a:rPr>
+              <a:t>RESERVAS RECURRENTES</a:t>
+            </a:r>
+          </a:p>
+          <a:p>
+            <a:r>
+              <a:rPr lang="es-ES" dirty="0">
+                <a:solidFill>
+                  <a:schemeClr val="accent4">
+                    <a:lumMod val="50000"/>
+                  </a:schemeClr>
+                </a:solidFill>
+              </a:rPr>
+              <a:t>CALENDARIO VISUAL</a:t>
             </a:r>
           </a:p>
         </p:txBody>
       </p:sp>
       <p:pic>
         <p:nvPicPr>
-          <p:cNvPr id="5" name="Marcador de contenido 4">
-            <a:extLst>
-              <a:ext uri="{FF2B5EF4-FFF2-40B4-BE49-F238E27FC236}">
-                <a16:creationId xmlns:a16="http://schemas.microsoft.com/office/drawing/2014/main" id="{E7256F20-8378-0B50-1591-C64F4B056570}"/>
+          <p:cNvPr id="5" name="Imagen 4">
+            <a:extLst>
+              <a:ext uri="{FF2B5EF4-FFF2-40B4-BE49-F238E27FC236}">
+                <a16:creationId xmlns:a16="http://schemas.microsoft.com/office/drawing/2014/main" id="{9939B0B5-506B-43DF-4BF9-218B6FE011A3}"/>
               </a:ext>
             </a:extLst>
           </p:cNvPr>
           <p:cNvPicPr>
-            <a:picLocks noGrp="1" noChangeAspect="1"/>
+            <a:picLocks noChangeAspect="1"/>
           </p:cNvPicPr>
-          <p:nvPr>
-            <p:ph idx="1"/>
-          </p:nvPr>
+          <p:nvPr/>
         </p:nvPicPr>
         <p:blipFill>
           <a:blip r:embed="rId2"/>
@@ -5556,15 +5880,18 @@
         </p:blipFill>
         <p:spPr>
           <a:xfrm>
-            <a:off x="1638300" y="2074655"/>
-            <a:ext cx="8915400" cy="4102515"/>
-          </a:xfrm>
+            <a:off x="6569399" y="1371600"/>
+            <a:ext cx="4458322" cy="4925112"/>
+          </a:xfrm>
+          <a:prstGeom prst="rect">
+            <a:avLst/>
+          </a:prstGeom>
         </p:spPr>
       </p:pic>
     </p:spTree>
     <p:extLst>
       <p:ext uri="{BB962C8B-B14F-4D97-AF65-F5344CB8AC3E}">
-        <p14:creationId xmlns:p14="http://schemas.microsoft.com/office/powerpoint/2010/main" val="330679039"/>
+        <p14:creationId xmlns:p14="http://schemas.microsoft.com/office/powerpoint/2010/main" val="2780896091"/>
       </p:ext>
     </p:extLst>
   </p:cSld>

</xml_diff>